<commit_message>
Réflexions sur un TP Arduino
</commit_message>
<xml_diff>
--- a/Arduino/Documentation_Arduino.pptx
+++ b/Arduino/Documentation_Arduino.pptx
@@ -5,14 +5,18 @@
     <p:sldMasterId id="2147483672" r:id="rId1"/>
   </p:sldMasterIdLst>
   <p:notesMasterIdLst>
-    <p:notesMasterId r:id="rId4"/>
+    <p:notesMasterId r:id="rId8"/>
   </p:notesMasterIdLst>
   <p:handoutMasterIdLst>
-    <p:handoutMasterId r:id="rId5"/>
+    <p:handoutMasterId r:id="rId9"/>
   </p:handoutMasterIdLst>
   <p:sldIdLst>
     <p:sldId id="256" r:id="rId2"/>
     <p:sldId id="257" r:id="rId3"/>
+    <p:sldId id="258" r:id="rId4"/>
+    <p:sldId id="259" r:id="rId5"/>
+    <p:sldId id="260" r:id="rId6"/>
+    <p:sldId id="261" r:id="rId7"/>
   </p:sldIdLst>
   <p:sldSz cx="9144000" cy="6858000" type="screen4x3"/>
   <p:notesSz cx="7099300" cy="10234613"/>
@@ -5068,7 +5072,7 @@
           <a:p>
             <a:fld id="{0063AF53-F080-4EED-89A2-71072976191D}" type="datetimeFigureOut">
               <a:rPr lang="fr-FR" smtClean="0"/>
-              <a:t>19/01/2015</a:t>
+              <a:t>20/01/2015</a:t>
             </a:fld>
             <a:endParaRPr lang="fr-FR"/>
           </a:p>
@@ -5234,7 +5238,7 @@
             <a:fld id="{408F55C5-7F94-4427-AC6E-B68A66649CA8}" type="datetimeFigureOut">
               <a:rPr lang="fr-FR" smtClean="0"/>
               <a:pPr/>
-              <a:t>19/01/2015</a:t>
+              <a:t>20/01/2015</a:t>
             </a:fld>
             <a:endParaRPr lang="fr-FR"/>
           </a:p>
@@ -5640,7 +5644,7 @@
           <a:p>
             <a:fld id="{9D56727F-6563-47CD-B250-CBA7B4B4FBDE}" type="datetime1">
               <a:rPr lang="fr-FR" smtClean="0"/>
-              <a:t>19/01/2015</a:t>
+              <a:t>20/01/2015</a:t>
             </a:fld>
             <a:endParaRPr lang="fr-BE"/>
           </a:p>
@@ -6514,7 +6518,7 @@
           <a:p>
             <a:fld id="{19ABCAB6-D49B-46FD-870F-99E10975C18F}" type="datetime1">
               <a:rPr lang="fr-FR" smtClean="0"/>
-              <a:t>19/01/2015</a:t>
+              <a:t>20/01/2015</a:t>
             </a:fld>
             <a:endParaRPr lang="fr-BE"/>
           </a:p>
@@ -6694,7 +6698,7 @@
           <a:p>
             <a:fld id="{DEEDBEA9-D968-4EC1-A19A-1F76B691A58C}" type="datetime1">
               <a:rPr lang="fr-FR" smtClean="0"/>
-              <a:t>19/01/2015</a:t>
+              <a:t>20/01/2015</a:t>
             </a:fld>
             <a:endParaRPr lang="fr-BE"/>
           </a:p>
@@ -6869,7 +6873,7 @@
           <a:p>
             <a:fld id="{9FC95688-4DB0-4F51-94A9-29BA89D545B3}" type="datetime1">
               <a:rPr lang="fr-FR" smtClean="0"/>
-              <a:t>19/01/2015</a:t>
+              <a:t>20/01/2015</a:t>
             </a:fld>
             <a:endParaRPr lang="fr-BE"/>
           </a:p>
@@ -7091,7 +7095,7 @@
           <a:p>
             <a:fld id="{20848678-D788-46FE-B700-C9269C74C891}" type="datetime1">
               <a:rPr lang="fr-FR" smtClean="0"/>
-              <a:t>19/01/2015</a:t>
+              <a:t>20/01/2015</a:t>
             </a:fld>
             <a:endParaRPr lang="fr-BE"/>
           </a:p>
@@ -7910,7 +7914,7 @@
           <a:p>
             <a:fld id="{79C16800-6255-4A73-95D9-53ECCA86BF18}" type="datetime1">
               <a:rPr lang="fr-FR" smtClean="0"/>
-              <a:t>19/01/2015</a:t>
+              <a:t>20/01/2015</a:t>
             </a:fld>
             <a:endParaRPr lang="fr-BE"/>
           </a:p>
@@ -8151,7 +8155,7 @@
           <a:p>
             <a:fld id="{2ECF0889-EA02-48F1-86FE-1B2AAC4C247E}" type="datetime1">
               <a:rPr lang="fr-FR" smtClean="0"/>
-              <a:t>19/01/2015</a:t>
+              <a:t>20/01/2015</a:t>
             </a:fld>
             <a:endParaRPr lang="fr-BE"/>
           </a:p>
@@ -8479,7 +8483,7 @@
           <a:p>
             <a:fld id="{712E9D54-6766-4EFC-BDD9-0C3193CEE8BD}" type="datetime1">
               <a:rPr lang="fr-FR" smtClean="0"/>
-              <a:t>19/01/2015</a:t>
+              <a:t>20/01/2015</a:t>
             </a:fld>
             <a:endParaRPr lang="fr-BE"/>
           </a:p>
@@ -8574,7 +8578,7 @@
           <a:p>
             <a:fld id="{5469AE92-F693-4AF4-B39E-ECB41C1DA14C}" type="datetime1">
               <a:rPr lang="fr-FR" smtClean="0"/>
-              <a:t>19/01/2015</a:t>
+              <a:t>20/01/2015</a:t>
             </a:fld>
             <a:endParaRPr lang="fr-BE"/>
           </a:p>
@@ -9096,7 +9100,7 @@
           <a:p>
             <a:fld id="{15EB620E-D183-4F2A-BD4F-6B1729D1A0DE}" type="datetime1">
               <a:rPr lang="fr-FR" smtClean="0"/>
-              <a:t>19/01/2015</a:t>
+              <a:t>20/01/2015</a:t>
             </a:fld>
             <a:endParaRPr lang="fr-BE"/>
           </a:p>
@@ -9612,7 +9616,7 @@
           <a:p>
             <a:fld id="{2D38B004-A344-4981-8789-E15D3302231A}" type="datetime1">
               <a:rPr lang="fr-FR" smtClean="0"/>
-              <a:t>19/01/2015</a:t>
+              <a:t>20/01/2015</a:t>
             </a:fld>
             <a:endParaRPr lang="fr-BE"/>
           </a:p>
@@ -9862,7 +9866,7 @@
           <a:p>
             <a:fld id="{002E150F-AA26-4E99-A02A-7CA355CA54B4}" type="datetime1">
               <a:rPr lang="fr-FR" smtClean="0"/>
-              <a:t>19/01/2015</a:t>
+              <a:t>20/01/2015</a:t>
             </a:fld>
             <a:endParaRPr lang="fr-BE"/>
           </a:p>
@@ -11059,6 +11063,870 @@
     <p:extLst>
       <p:ext uri="{BB962C8B-B14F-4D97-AF65-F5344CB8AC3E}">
         <p14:creationId xmlns:p14="http://schemas.microsoft.com/office/powerpoint/2010/main" val="1017040034"/>
+      </p:ext>
+    </p:extLst>
+  </p:cSld>
+  <p:clrMapOvr>
+    <a:masterClrMapping/>
+  </p:clrMapOvr>
+</p:sld>
+</file>
+
+<file path=ppt/slides/slide3.xml><?xml version="1.0" encoding="utf-8"?>
+<p:sld xmlns:a="http://schemas.openxmlformats.org/drawingml/2006/main" xmlns:r="http://schemas.openxmlformats.org/officeDocument/2006/relationships" xmlns:p="http://schemas.openxmlformats.org/presentationml/2006/main">
+  <p:cSld>
+    <p:spTree>
+      <p:nvGrpSpPr>
+        <p:cNvPr id="1" name=""/>
+        <p:cNvGrpSpPr/>
+        <p:nvPr/>
+      </p:nvGrpSpPr>
+      <p:grpSpPr>
+        <a:xfrm>
+          <a:off x="0" y="0"/>
+          <a:ext cx="0" cy="0"/>
+          <a:chOff x="0" y="0"/>
+          <a:chExt cx="0" cy="0"/>
+        </a:xfrm>
+      </p:grpSpPr>
+      <p:sp>
+        <p:nvSpPr>
+          <p:cNvPr id="2" name="Titre 1"/>
+          <p:cNvSpPr>
+            <a:spLocks noGrp="1"/>
+          </p:cNvSpPr>
+          <p:nvPr>
+            <p:ph type="title"/>
+          </p:nvPr>
+        </p:nvSpPr>
+        <p:spPr/>
+        <p:txBody>
+          <a:bodyPr/>
+          <a:lstStyle/>
+          <a:p>
+            <a:r>
+              <a:rPr lang="fr-FR" dirty="0" smtClean="0"/>
+              <a:t>L’interface Logicielle</a:t>
+            </a:r>
+            <a:endParaRPr lang="fr-FR" dirty="0"/>
+          </a:p>
+        </p:txBody>
+      </p:sp>
+      <p:sp>
+        <p:nvSpPr>
+          <p:cNvPr id="3" name="Espace réservé du contenu 2"/>
+          <p:cNvSpPr>
+            <a:spLocks noGrp="1"/>
+          </p:cNvSpPr>
+          <p:nvPr>
+            <p:ph sz="quarter" idx="1"/>
+          </p:nvPr>
+        </p:nvSpPr>
+        <p:spPr/>
+        <p:txBody>
+          <a:bodyPr/>
+          <a:lstStyle/>
+          <a:p>
+            <a:endParaRPr lang="fr-FR" dirty="0"/>
+          </a:p>
+        </p:txBody>
+      </p:sp>
+      <p:sp>
+        <p:nvSpPr>
+          <p:cNvPr id="4" name="Espace réservé du numéro de diapositive 3"/>
+          <p:cNvSpPr>
+            <a:spLocks noGrp="1"/>
+          </p:cNvSpPr>
+          <p:nvPr>
+            <p:ph type="sldNum" sz="quarter" idx="15"/>
+          </p:nvPr>
+        </p:nvSpPr>
+        <p:spPr/>
+        <p:txBody>
+          <a:bodyPr/>
+          <a:lstStyle/>
+          <a:p>
+            <a:fld id="{CF4668DC-857F-487D-BFFA-8C0CA5037977}" type="slidenum">
+              <a:rPr lang="fr-BE" smtClean="0"/>
+              <a:pPr/>
+              <a:t>3</a:t>
+            </a:fld>
+            <a:endParaRPr lang="fr-BE"/>
+          </a:p>
+        </p:txBody>
+      </p:sp>
+      <p:sp>
+        <p:nvSpPr>
+          <p:cNvPr id="5" name="Espace réservé du pied de page 4"/>
+          <p:cNvSpPr>
+            <a:spLocks noGrp="1"/>
+          </p:cNvSpPr>
+          <p:nvPr>
+            <p:ph type="ftr" sz="quarter" idx="16"/>
+          </p:nvPr>
+        </p:nvSpPr>
+        <p:spPr/>
+        <p:txBody>
+          <a:bodyPr/>
+          <a:lstStyle/>
+          <a:p>
+            <a:r>
+              <a:rPr lang="fr-BE" smtClean="0"/>
+              <a:t>Xavier Pessoles - Jean-Pierre Pupier</a:t>
+            </a:r>
+            <a:endParaRPr lang="fr-BE"/>
+          </a:p>
+        </p:txBody>
+      </p:sp>
+      <p:pic>
+        <p:nvPicPr>
+          <p:cNvPr id="1026" name="Picture 2"/>
+          <p:cNvPicPr>
+            <a:picLocks noChangeAspect="1" noChangeArrowheads="1"/>
+          </p:cNvPicPr>
+          <p:nvPr/>
+        </p:nvPicPr>
+        <p:blipFill>
+          <a:blip r:embed="rId2" cstate="print">
+            <a:extLst>
+              <a:ext uri="{28A0092B-C50C-407E-A947-70E740481C1C}">
+                <a14:useLocalDpi xmlns:a14="http://schemas.microsoft.com/office/drawing/2010/main" val="0"/>
+              </a:ext>
+            </a:extLst>
+          </a:blip>
+          <a:srcRect/>
+          <a:stretch>
+            <a:fillRect/>
+          </a:stretch>
+        </p:blipFill>
+        <p:spPr bwMode="auto">
+          <a:xfrm>
+            <a:off x="179512" y="1196753"/>
+            <a:ext cx="2088232" cy="2499302"/>
+          </a:xfrm>
+          <a:prstGeom prst="rect">
+            <a:avLst/>
+          </a:prstGeom>
+          <a:noFill/>
+          <a:ln>
+            <a:noFill/>
+          </a:ln>
+          <a:effectLst/>
+          <a:extLst>
+            <a:ext uri="{909E8E84-426E-40DD-AFC4-6F175D3DCCD1}">
+              <a14:hiddenFill xmlns:a14="http://schemas.microsoft.com/office/drawing/2010/main">
+                <a:solidFill>
+                  <a:schemeClr val="accent1"/>
+                </a:solidFill>
+              </a14:hiddenFill>
+            </a:ext>
+            <a:ext uri="{91240B29-F687-4F45-9708-019B960494DF}">
+              <a14:hiddenLine xmlns:a14="http://schemas.microsoft.com/office/drawing/2010/main" w="9525">
+                <a:solidFill>
+                  <a:schemeClr val="tx1"/>
+                </a:solidFill>
+                <a:miter lim="800000"/>
+                <a:headEnd/>
+                <a:tailEnd/>
+              </a14:hiddenLine>
+            </a:ext>
+            <a:ext uri="{AF507438-7753-43E0-B8FC-AC1667EBCBE1}">
+              <a14:hiddenEffects xmlns:a14="http://schemas.microsoft.com/office/drawing/2010/main">
+                <a:effectLst>
+                  <a:outerShdw dist="35921" dir="2700000" algn="ctr" rotWithShape="0">
+                    <a:schemeClr val="bg2"/>
+                  </a:outerShdw>
+                </a:effectLst>
+              </a14:hiddenEffects>
+            </a:ext>
+          </a:extLst>
+        </p:spPr>
+      </p:pic>
+      <p:pic>
+        <p:nvPicPr>
+          <p:cNvPr id="1028" name="Picture 4"/>
+          <p:cNvPicPr>
+            <a:picLocks noChangeAspect="1" noChangeArrowheads="1"/>
+          </p:cNvPicPr>
+          <p:nvPr/>
+        </p:nvPicPr>
+        <p:blipFill>
+          <a:blip r:embed="rId3" cstate="print">
+            <a:extLst>
+              <a:ext uri="{28A0092B-C50C-407E-A947-70E740481C1C}">
+                <a14:useLocalDpi xmlns:a14="http://schemas.microsoft.com/office/drawing/2010/main" val="0"/>
+              </a:ext>
+            </a:extLst>
+          </a:blip>
+          <a:srcRect/>
+          <a:stretch>
+            <a:fillRect/>
+          </a:stretch>
+        </p:blipFill>
+        <p:spPr bwMode="auto">
+          <a:xfrm>
+            <a:off x="179512" y="3997450"/>
+            <a:ext cx="2088232" cy="2498493"/>
+          </a:xfrm>
+          <a:prstGeom prst="rect">
+            <a:avLst/>
+          </a:prstGeom>
+          <a:noFill/>
+          <a:ln>
+            <a:noFill/>
+          </a:ln>
+          <a:effectLst/>
+          <a:extLst>
+            <a:ext uri="{909E8E84-426E-40DD-AFC4-6F175D3DCCD1}">
+              <a14:hiddenFill xmlns:a14="http://schemas.microsoft.com/office/drawing/2010/main">
+                <a:solidFill>
+                  <a:schemeClr val="accent1"/>
+                </a:solidFill>
+              </a14:hiddenFill>
+            </a:ext>
+            <a:ext uri="{91240B29-F687-4F45-9708-019B960494DF}">
+              <a14:hiddenLine xmlns:a14="http://schemas.microsoft.com/office/drawing/2010/main" w="9525">
+                <a:solidFill>
+                  <a:schemeClr val="tx1"/>
+                </a:solidFill>
+                <a:miter lim="800000"/>
+                <a:headEnd/>
+                <a:tailEnd/>
+              </a14:hiddenLine>
+            </a:ext>
+            <a:ext uri="{AF507438-7753-43E0-B8FC-AC1667EBCBE1}">
+              <a14:hiddenEffects xmlns:a14="http://schemas.microsoft.com/office/drawing/2010/main">
+                <a:effectLst>
+                  <a:outerShdw dist="35921" dir="2700000" algn="ctr" rotWithShape="0">
+                    <a:schemeClr val="bg2"/>
+                  </a:outerShdw>
+                </a:effectLst>
+              </a14:hiddenEffects>
+            </a:ext>
+          </a:extLst>
+        </p:spPr>
+      </p:pic>
+    </p:spTree>
+    <p:extLst>
+      <p:ext uri="{BB962C8B-B14F-4D97-AF65-F5344CB8AC3E}">
+        <p14:creationId xmlns:p14="http://schemas.microsoft.com/office/powerpoint/2010/main" val="1219242225"/>
+      </p:ext>
+    </p:extLst>
+  </p:cSld>
+  <p:clrMapOvr>
+    <a:masterClrMapping/>
+  </p:clrMapOvr>
+</p:sld>
+</file>
+
+<file path=ppt/slides/slide4.xml><?xml version="1.0" encoding="utf-8"?>
+<p:sld xmlns:a="http://schemas.openxmlformats.org/drawingml/2006/main" xmlns:r="http://schemas.openxmlformats.org/officeDocument/2006/relationships" xmlns:p="http://schemas.openxmlformats.org/presentationml/2006/main">
+  <p:cSld>
+    <p:spTree>
+      <p:nvGrpSpPr>
+        <p:cNvPr id="1" name=""/>
+        <p:cNvGrpSpPr/>
+        <p:nvPr/>
+      </p:nvGrpSpPr>
+      <p:grpSpPr>
+        <a:xfrm>
+          <a:off x="0" y="0"/>
+          <a:ext cx="0" cy="0"/>
+          <a:chOff x="0" y="0"/>
+          <a:chExt cx="0" cy="0"/>
+        </a:xfrm>
+      </p:grpSpPr>
+      <p:sp>
+        <p:nvSpPr>
+          <p:cNvPr id="2" name="Titre 1"/>
+          <p:cNvSpPr>
+            <a:spLocks noGrp="1"/>
+          </p:cNvSpPr>
+          <p:nvPr>
+            <p:ph type="title"/>
+          </p:nvPr>
+        </p:nvSpPr>
+        <p:spPr/>
+        <p:txBody>
+          <a:bodyPr>
+            <a:normAutofit fontScale="90000"/>
+          </a:bodyPr>
+          <a:lstStyle/>
+          <a:p>
+            <a:r>
+              <a:rPr lang="fr-FR" dirty="0" smtClean="0"/>
+              <a:t>Allumer et éteindre une </a:t>
+            </a:r>
+            <a:r>
+              <a:rPr lang="fr-FR" dirty="0" err="1" smtClean="0"/>
+              <a:t>Led</a:t>
+            </a:r>
+            <a:r>
+              <a:rPr lang="fr-FR" dirty="0"/>
+              <a:t> </a:t>
+            </a:r>
+            <a:r>
+              <a:rPr lang="fr-FR" dirty="0" smtClean="0"/>
+              <a:t>par périodes de 1 seconde</a:t>
+            </a:r>
+            <a:endParaRPr lang="fr-FR" dirty="0"/>
+          </a:p>
+        </p:txBody>
+      </p:sp>
+      <p:sp>
+        <p:nvSpPr>
+          <p:cNvPr id="4" name="Espace réservé du numéro de diapositive 3"/>
+          <p:cNvSpPr>
+            <a:spLocks noGrp="1"/>
+          </p:cNvSpPr>
+          <p:nvPr>
+            <p:ph type="sldNum" sz="quarter" idx="15"/>
+          </p:nvPr>
+        </p:nvSpPr>
+        <p:spPr/>
+        <p:txBody>
+          <a:bodyPr/>
+          <a:lstStyle/>
+          <a:p>
+            <a:fld id="{CF4668DC-857F-487D-BFFA-8C0CA5037977}" type="slidenum">
+              <a:rPr lang="fr-BE" smtClean="0"/>
+              <a:pPr/>
+              <a:t>4</a:t>
+            </a:fld>
+            <a:endParaRPr lang="fr-BE"/>
+          </a:p>
+        </p:txBody>
+      </p:sp>
+      <p:sp>
+        <p:nvSpPr>
+          <p:cNvPr id="5" name="Espace réservé du pied de page 4"/>
+          <p:cNvSpPr>
+            <a:spLocks noGrp="1"/>
+          </p:cNvSpPr>
+          <p:nvPr>
+            <p:ph type="ftr" sz="quarter" idx="16"/>
+          </p:nvPr>
+        </p:nvSpPr>
+        <p:spPr/>
+        <p:txBody>
+          <a:bodyPr/>
+          <a:lstStyle/>
+          <a:p>
+            <a:r>
+              <a:rPr lang="fr-BE" smtClean="0"/>
+              <a:t>Xavier Pessoles - Jean-Pierre Pupier</a:t>
+            </a:r>
+            <a:endParaRPr lang="fr-BE"/>
+          </a:p>
+        </p:txBody>
+      </p:sp>
+      <p:sp>
+        <p:nvSpPr>
+          <p:cNvPr id="6" name="Espace réservé du contenu 5"/>
+          <p:cNvSpPr>
+            <a:spLocks noGrp="1"/>
+          </p:cNvSpPr>
+          <p:nvPr>
+            <p:ph sz="quarter" idx="1"/>
+          </p:nvPr>
+        </p:nvSpPr>
+        <p:spPr/>
+        <p:txBody>
+          <a:bodyPr/>
+          <a:lstStyle/>
+          <a:p>
+            <a:endParaRPr lang="fr-FR"/>
+          </a:p>
+        </p:txBody>
+      </p:sp>
+    </p:spTree>
+    <p:extLst>
+      <p:ext uri="{BB962C8B-B14F-4D97-AF65-F5344CB8AC3E}">
+        <p14:creationId xmlns:p14="http://schemas.microsoft.com/office/powerpoint/2010/main" val="215953591"/>
+      </p:ext>
+    </p:extLst>
+  </p:cSld>
+  <p:clrMapOvr>
+    <a:masterClrMapping/>
+  </p:clrMapOvr>
+</p:sld>
+</file>
+
+<file path=ppt/slides/slide5.xml><?xml version="1.0" encoding="utf-8"?>
+<p:sld xmlns:a="http://schemas.openxmlformats.org/drawingml/2006/main" xmlns:r="http://schemas.openxmlformats.org/officeDocument/2006/relationships" xmlns:p="http://schemas.openxmlformats.org/presentationml/2006/main">
+  <p:cSld>
+    <p:spTree>
+      <p:nvGrpSpPr>
+        <p:cNvPr id="1" name=""/>
+        <p:cNvGrpSpPr/>
+        <p:nvPr/>
+      </p:nvGrpSpPr>
+      <p:grpSpPr>
+        <a:xfrm>
+          <a:off x="0" y="0"/>
+          <a:ext cx="0" cy="0"/>
+          <a:chOff x="0" y="0"/>
+          <a:chExt cx="0" cy="0"/>
+        </a:xfrm>
+      </p:grpSpPr>
+      <p:sp>
+        <p:nvSpPr>
+          <p:cNvPr id="2" name="Titre 1"/>
+          <p:cNvSpPr>
+            <a:spLocks noGrp="1"/>
+          </p:cNvSpPr>
+          <p:nvPr>
+            <p:ph type="title"/>
+          </p:nvPr>
+        </p:nvSpPr>
+        <p:spPr/>
+        <p:txBody>
+          <a:bodyPr/>
+          <a:lstStyle/>
+          <a:p>
+            <a:r>
+              <a:rPr lang="fr-FR" dirty="0" smtClean="0"/>
+              <a:t>Spécifications du Potentiomètre</a:t>
+            </a:r>
+            <a:endParaRPr lang="fr-FR" dirty="0"/>
+          </a:p>
+        </p:txBody>
+      </p:sp>
+      <p:sp>
+        <p:nvSpPr>
+          <p:cNvPr id="3" name="Espace réservé du contenu 2"/>
+          <p:cNvSpPr>
+            <a:spLocks noGrp="1"/>
+          </p:cNvSpPr>
+          <p:nvPr>
+            <p:ph sz="quarter" idx="1"/>
+          </p:nvPr>
+        </p:nvSpPr>
+        <p:spPr/>
+        <p:txBody>
+          <a:bodyPr>
+            <a:normAutofit fontScale="92500" lnSpcReduction="20000"/>
+          </a:bodyPr>
+          <a:lstStyle/>
+          <a:p>
+            <a:r>
+              <a:rPr lang="fr-FR" dirty="0" err="1" smtClean="0"/>
+              <a:t>Omeg</a:t>
+            </a:r>
+            <a:r>
+              <a:rPr lang="fr-FR" dirty="0" smtClean="0"/>
+              <a:t> PC20BU-47K-Lin</a:t>
+            </a:r>
+          </a:p>
+          <a:p>
+            <a:pPr lvl="1"/>
+            <a:r>
+              <a:rPr lang="fr-FR" dirty="0" smtClean="0"/>
+              <a:t>Type de potentiomètre : axial, </a:t>
+            </a:r>
+            <a:r>
+              <a:rPr lang="fr-FR" dirty="0" err="1" smtClean="0"/>
+              <a:t>monotour</a:t>
+            </a:r>
+            <a:endParaRPr lang="fr-FR" dirty="0" smtClean="0"/>
+          </a:p>
+          <a:p>
+            <a:pPr lvl="1"/>
+            <a:r>
+              <a:rPr lang="fr-FR" dirty="0" smtClean="0"/>
+              <a:t>Résistance : 47 k</a:t>
+            </a:r>
+            <a:r>
+              <a:rPr lang="el-GR" dirty="0" smtClean="0"/>
+              <a:t>Ω</a:t>
+            </a:r>
+            <a:endParaRPr lang="fr-FR" dirty="0" smtClean="0"/>
+          </a:p>
+          <a:p>
+            <a:pPr lvl="1"/>
+            <a:r>
+              <a:rPr lang="fr-FR" dirty="0" smtClean="0"/>
+              <a:t>Puissance = 0,4 kW</a:t>
+            </a:r>
+          </a:p>
+          <a:p>
+            <a:pPr lvl="1"/>
+            <a:r>
+              <a:rPr lang="fr-FR" dirty="0" smtClean="0"/>
+              <a:t>Tolérance :</a:t>
+            </a:r>
+            <a:r>
+              <a:rPr lang="fr-FR" dirty="0"/>
+              <a:t> ±20</a:t>
+            </a:r>
+            <a:r>
+              <a:rPr lang="fr-FR" dirty="0" smtClean="0"/>
+              <a:t>%</a:t>
+            </a:r>
+          </a:p>
+          <a:p>
+            <a:pPr lvl="1"/>
+            <a:r>
+              <a:rPr lang="fr-FR" dirty="0" smtClean="0"/>
+              <a:t>Diamètre de l’axe : 6 mm</a:t>
+            </a:r>
+          </a:p>
+          <a:p>
+            <a:pPr lvl="1"/>
+            <a:r>
+              <a:rPr lang="fr-FR" dirty="0" smtClean="0"/>
+              <a:t>Caractéristique : linéaire</a:t>
+            </a:r>
+          </a:p>
+          <a:p>
+            <a:pPr lvl="1"/>
+            <a:r>
+              <a:rPr lang="fr-FR" dirty="0" smtClean="0"/>
+              <a:t>Montage : THT</a:t>
+            </a:r>
+          </a:p>
+          <a:p>
+            <a:pPr lvl="1"/>
+            <a:r>
+              <a:rPr lang="fr-FR" dirty="0" smtClean="0"/>
+              <a:t>Encombrement du corps : Diamètre 20mm x 10mm</a:t>
+            </a:r>
+          </a:p>
+          <a:p>
+            <a:pPr lvl="1"/>
+            <a:r>
+              <a:rPr lang="fr-FR" dirty="0" smtClean="0"/>
+              <a:t>Matériau de la piste : plastique</a:t>
+            </a:r>
+          </a:p>
+          <a:p>
+            <a:pPr lvl="1"/>
+            <a:r>
+              <a:rPr lang="fr-FR" dirty="0" smtClean="0"/>
+              <a:t>Type d’usinage de l’axe : lisse</a:t>
+            </a:r>
+          </a:p>
+          <a:p>
+            <a:pPr lvl="1"/>
+            <a:r>
+              <a:rPr lang="fr-FR" dirty="0" smtClean="0"/>
+              <a:t>Longueur de l’axe : 43 mm</a:t>
+            </a:r>
+          </a:p>
+          <a:p>
+            <a:pPr lvl="1"/>
+            <a:r>
+              <a:rPr lang="fr-FR" dirty="0" smtClean="0"/>
+              <a:t>Longueur du filetage : 7 mm</a:t>
+            </a:r>
+          </a:p>
+          <a:p>
+            <a:pPr lvl="1"/>
+            <a:r>
+              <a:rPr lang="fr-FR" dirty="0" smtClean="0"/>
+              <a:t>Trame des pistes : 5,08 mm</a:t>
+            </a:r>
+          </a:p>
+          <a:p>
+            <a:pPr lvl="1"/>
+            <a:r>
+              <a:rPr lang="fr-FR" dirty="0" smtClean="0"/>
+              <a:t>Course mécanique : 300°</a:t>
+            </a:r>
+          </a:p>
+          <a:p>
+            <a:pPr lvl="1"/>
+            <a:r>
+              <a:rPr lang="fr-FR" dirty="0" smtClean="0"/>
+              <a:t>Caractéristique des potentiomètres : mono</a:t>
+            </a:r>
+          </a:p>
+          <a:p>
+            <a:pPr lvl="1"/>
+            <a:r>
+              <a:rPr lang="fr-FR" dirty="0" smtClean="0"/>
+              <a:t>Tension de travail maxi : 500 VDC</a:t>
+            </a:r>
+          </a:p>
+        </p:txBody>
+      </p:sp>
+      <p:sp>
+        <p:nvSpPr>
+          <p:cNvPr id="4" name="Espace réservé du numéro de diapositive 3"/>
+          <p:cNvSpPr>
+            <a:spLocks noGrp="1"/>
+          </p:cNvSpPr>
+          <p:nvPr>
+            <p:ph type="sldNum" sz="quarter" idx="15"/>
+          </p:nvPr>
+        </p:nvSpPr>
+        <p:spPr/>
+        <p:txBody>
+          <a:bodyPr/>
+          <a:lstStyle/>
+          <a:p>
+            <a:fld id="{CF4668DC-857F-487D-BFFA-8C0CA5037977}" type="slidenum">
+              <a:rPr lang="fr-BE" smtClean="0"/>
+              <a:pPr/>
+              <a:t>5</a:t>
+            </a:fld>
+            <a:endParaRPr lang="fr-BE"/>
+          </a:p>
+        </p:txBody>
+      </p:sp>
+      <p:sp>
+        <p:nvSpPr>
+          <p:cNvPr id="5" name="Espace réservé du pied de page 4"/>
+          <p:cNvSpPr>
+            <a:spLocks noGrp="1"/>
+          </p:cNvSpPr>
+          <p:nvPr>
+            <p:ph type="ftr" sz="quarter" idx="16"/>
+          </p:nvPr>
+        </p:nvSpPr>
+        <p:spPr/>
+        <p:txBody>
+          <a:bodyPr/>
+          <a:lstStyle/>
+          <a:p>
+            <a:r>
+              <a:rPr lang="fr-BE" smtClean="0"/>
+              <a:t>Xavier Pessoles - Jean-Pierre Pupier</a:t>
+            </a:r>
+            <a:endParaRPr lang="fr-BE"/>
+          </a:p>
+        </p:txBody>
+      </p:sp>
+      <p:pic>
+        <p:nvPicPr>
+          <p:cNvPr id="2051" name="Picture 3"/>
+          <p:cNvPicPr>
+            <a:picLocks noChangeAspect="1" noChangeArrowheads="1"/>
+          </p:cNvPicPr>
+          <p:nvPr/>
+        </p:nvPicPr>
+        <p:blipFill>
+          <a:blip r:embed="rId2" cstate="print">
+            <a:extLst>
+              <a:ext uri="{28A0092B-C50C-407E-A947-70E740481C1C}">
+                <a14:useLocalDpi xmlns:a14="http://schemas.microsoft.com/office/drawing/2010/main" val="0"/>
+              </a:ext>
+            </a:extLst>
+          </a:blip>
+          <a:srcRect/>
+          <a:stretch>
+            <a:fillRect/>
+          </a:stretch>
+        </p:blipFill>
+        <p:spPr bwMode="auto">
+          <a:xfrm>
+            <a:off x="6440982" y="55878"/>
+            <a:ext cx="2688234" cy="1954362"/>
+          </a:xfrm>
+          <a:prstGeom prst="rect">
+            <a:avLst/>
+          </a:prstGeom>
+          <a:noFill/>
+          <a:ln>
+            <a:noFill/>
+          </a:ln>
+          <a:effectLst/>
+          <a:extLst>
+            <a:ext uri="{909E8E84-426E-40DD-AFC4-6F175D3DCCD1}">
+              <a14:hiddenFill xmlns:a14="http://schemas.microsoft.com/office/drawing/2010/main">
+                <a:solidFill>
+                  <a:schemeClr val="accent1"/>
+                </a:solidFill>
+              </a14:hiddenFill>
+            </a:ext>
+            <a:ext uri="{91240B29-F687-4F45-9708-019B960494DF}">
+              <a14:hiddenLine xmlns:a14="http://schemas.microsoft.com/office/drawing/2010/main" w="9525">
+                <a:solidFill>
+                  <a:schemeClr val="tx1"/>
+                </a:solidFill>
+                <a:miter lim="800000"/>
+                <a:headEnd/>
+                <a:tailEnd/>
+              </a14:hiddenLine>
+            </a:ext>
+            <a:ext uri="{AF507438-7753-43E0-B8FC-AC1667EBCBE1}">
+              <a14:hiddenEffects xmlns:a14="http://schemas.microsoft.com/office/drawing/2010/main">
+                <a:effectLst>
+                  <a:outerShdw dist="35921" dir="2700000" algn="ctr" rotWithShape="0">
+                    <a:schemeClr val="bg2"/>
+                  </a:outerShdw>
+                </a:effectLst>
+              </a14:hiddenEffects>
+            </a:ext>
+          </a:extLst>
+        </p:spPr>
+      </p:pic>
+    </p:spTree>
+    <p:extLst>
+      <p:ext uri="{BB962C8B-B14F-4D97-AF65-F5344CB8AC3E}">
+        <p14:creationId xmlns:p14="http://schemas.microsoft.com/office/powerpoint/2010/main" val="3919339203"/>
+      </p:ext>
+    </p:extLst>
+  </p:cSld>
+  <p:clrMapOvr>
+    <a:masterClrMapping/>
+  </p:clrMapOvr>
+</p:sld>
+</file>
+
+<file path=ppt/slides/slide6.xml><?xml version="1.0" encoding="utf-8"?>
+<p:sld xmlns:a="http://schemas.openxmlformats.org/drawingml/2006/main" xmlns:r="http://schemas.openxmlformats.org/officeDocument/2006/relationships" xmlns:p="http://schemas.openxmlformats.org/presentationml/2006/main">
+  <p:cSld>
+    <p:spTree>
+      <p:nvGrpSpPr>
+        <p:cNvPr id="1" name=""/>
+        <p:cNvGrpSpPr/>
+        <p:nvPr/>
+      </p:nvGrpSpPr>
+      <p:grpSpPr>
+        <a:xfrm>
+          <a:off x="0" y="0"/>
+          <a:ext cx="0" cy="0"/>
+          <a:chOff x="0" y="0"/>
+          <a:chExt cx="0" cy="0"/>
+        </a:xfrm>
+      </p:grpSpPr>
+      <p:sp>
+        <p:nvSpPr>
+          <p:cNvPr id="2" name="Titre 1"/>
+          <p:cNvSpPr>
+            <a:spLocks noGrp="1"/>
+          </p:cNvSpPr>
+          <p:nvPr>
+            <p:ph type="title"/>
+          </p:nvPr>
+        </p:nvSpPr>
+        <p:spPr/>
+        <p:txBody>
+          <a:bodyPr>
+            <a:normAutofit fontScale="90000"/>
+          </a:bodyPr>
+          <a:lstStyle/>
+          <a:p>
+            <a:r>
+              <a:rPr lang="fr-FR" dirty="0" smtClean="0"/>
+              <a:t>Lecture des informations aux bornes d’un potentiomètre</a:t>
+            </a:r>
+            <a:endParaRPr lang="fr-FR" dirty="0"/>
+          </a:p>
+        </p:txBody>
+      </p:sp>
+      <p:sp>
+        <p:nvSpPr>
+          <p:cNvPr id="3" name="Espace réservé du contenu 2"/>
+          <p:cNvSpPr>
+            <a:spLocks noGrp="1"/>
+          </p:cNvSpPr>
+          <p:nvPr>
+            <p:ph sz="quarter" idx="1"/>
+          </p:nvPr>
+        </p:nvSpPr>
+        <p:spPr/>
+        <p:txBody>
+          <a:bodyPr/>
+          <a:lstStyle/>
+          <a:p>
+            <a:endParaRPr lang="fr-FR" dirty="0"/>
+          </a:p>
+        </p:txBody>
+      </p:sp>
+      <p:sp>
+        <p:nvSpPr>
+          <p:cNvPr id="4" name="Espace réservé du numéro de diapositive 3"/>
+          <p:cNvSpPr>
+            <a:spLocks noGrp="1"/>
+          </p:cNvSpPr>
+          <p:nvPr>
+            <p:ph type="sldNum" sz="quarter" idx="15"/>
+          </p:nvPr>
+        </p:nvSpPr>
+        <p:spPr/>
+        <p:txBody>
+          <a:bodyPr/>
+          <a:lstStyle/>
+          <a:p>
+            <a:fld id="{CF4668DC-857F-487D-BFFA-8C0CA5037977}" type="slidenum">
+              <a:rPr lang="fr-BE" smtClean="0"/>
+              <a:pPr/>
+              <a:t>6</a:t>
+            </a:fld>
+            <a:endParaRPr lang="fr-BE"/>
+          </a:p>
+        </p:txBody>
+      </p:sp>
+      <p:sp>
+        <p:nvSpPr>
+          <p:cNvPr id="5" name="Espace réservé du pied de page 4"/>
+          <p:cNvSpPr>
+            <a:spLocks noGrp="1"/>
+          </p:cNvSpPr>
+          <p:nvPr>
+            <p:ph type="ftr" sz="quarter" idx="16"/>
+          </p:nvPr>
+        </p:nvSpPr>
+        <p:spPr/>
+        <p:txBody>
+          <a:bodyPr/>
+          <a:lstStyle/>
+          <a:p>
+            <a:r>
+              <a:rPr lang="fr-BE" smtClean="0"/>
+              <a:t>Xavier Pessoles - Jean-Pierre Pupier</a:t>
+            </a:r>
+            <a:endParaRPr lang="fr-BE"/>
+          </a:p>
+        </p:txBody>
+      </p:sp>
+      <p:pic>
+        <p:nvPicPr>
+          <p:cNvPr id="3074" name="Picture 2" descr="C:\Enseignements\GitHub\TP_Documents\Arduino\Arduino_Sources\Potentiometre\Potentiomètre_bb.png"/>
+          <p:cNvPicPr>
+            <a:picLocks noChangeAspect="1" noChangeArrowheads="1"/>
+          </p:cNvPicPr>
+          <p:nvPr/>
+        </p:nvPicPr>
+        <p:blipFill>
+          <a:blip r:embed="rId2" cstate="print">
+            <a:extLst>
+              <a:ext uri="{28A0092B-C50C-407E-A947-70E740481C1C}">
+                <a14:useLocalDpi xmlns:a14="http://schemas.microsoft.com/office/drawing/2010/main" val="0"/>
+              </a:ext>
+            </a:extLst>
+          </a:blip>
+          <a:srcRect/>
+          <a:stretch>
+            <a:fillRect/>
+          </a:stretch>
+        </p:blipFill>
+        <p:spPr bwMode="auto">
+          <a:xfrm>
+            <a:off x="1043608" y="1844824"/>
+            <a:ext cx="3881437" cy="2560638"/>
+          </a:xfrm>
+          <a:prstGeom prst="rect">
+            <a:avLst/>
+          </a:prstGeom>
+          <a:noFill/>
+          <a:extLst>
+            <a:ext uri="{909E8E84-426E-40DD-AFC4-6F175D3DCCD1}">
+              <a14:hiddenFill xmlns:a14="http://schemas.microsoft.com/office/drawing/2010/main">
+                <a:solidFill>
+                  <a:srgbClr val="FFFFFF"/>
+                </a:solidFill>
+              </a14:hiddenFill>
+            </a:ext>
+          </a:extLst>
+        </p:spPr>
+      </p:pic>
+    </p:spTree>
+    <p:extLst>
+      <p:ext uri="{BB962C8B-B14F-4D97-AF65-F5344CB8AC3E}">
+        <p14:creationId xmlns:p14="http://schemas.microsoft.com/office/powerpoint/2010/main" val="1400981599"/>
       </p:ext>
     </p:extLst>
   </p:cSld>

</xml_diff>

<commit_message>
Petites mises à jour
</commit_message>
<xml_diff>
--- a/Arduino/Documentation_Arduino.pptx
+++ b/Arduino/Documentation_Arduino.pptx
@@ -5,10 +5,10 @@
     <p:sldMasterId id="2147483672" r:id="rId1"/>
   </p:sldMasterIdLst>
   <p:notesMasterIdLst>
-    <p:notesMasterId r:id="rId8"/>
+    <p:notesMasterId r:id="rId9"/>
   </p:notesMasterIdLst>
   <p:handoutMasterIdLst>
-    <p:handoutMasterId r:id="rId9"/>
+    <p:handoutMasterId r:id="rId10"/>
   </p:handoutMasterIdLst>
   <p:sldIdLst>
     <p:sldId id="256" r:id="rId2"/>
@@ -17,6 +17,7 @@
     <p:sldId id="259" r:id="rId5"/>
     <p:sldId id="260" r:id="rId6"/>
     <p:sldId id="261" r:id="rId7"/>
+    <p:sldId id="262" r:id="rId8"/>
   </p:sldIdLst>
   <p:sldSz cx="9144000" cy="6858000" type="screen4x3"/>
   <p:notesSz cx="7099300" cy="10234613"/>
@@ -5072,7 +5073,7 @@
           <a:p>
             <a:fld id="{0063AF53-F080-4EED-89A2-71072976191D}" type="datetimeFigureOut">
               <a:rPr lang="fr-FR" smtClean="0"/>
-              <a:t>20/01/2015</a:t>
+              <a:t>24/01/2015</a:t>
             </a:fld>
             <a:endParaRPr lang="fr-FR"/>
           </a:p>
@@ -5238,7 +5239,7 @@
             <a:fld id="{408F55C5-7F94-4427-AC6E-B68A66649CA8}" type="datetimeFigureOut">
               <a:rPr lang="fr-FR" smtClean="0"/>
               <a:pPr/>
-              <a:t>20/01/2015</a:t>
+              <a:t>24/01/2015</a:t>
             </a:fld>
             <a:endParaRPr lang="fr-FR"/>
           </a:p>
@@ -5644,7 +5645,7 @@
           <a:p>
             <a:fld id="{9D56727F-6563-47CD-B250-CBA7B4B4FBDE}" type="datetime1">
               <a:rPr lang="fr-FR" smtClean="0"/>
-              <a:t>20/01/2015</a:t>
+              <a:t>24/01/2015</a:t>
             </a:fld>
             <a:endParaRPr lang="fr-BE"/>
           </a:p>
@@ -6518,7 +6519,7 @@
           <a:p>
             <a:fld id="{19ABCAB6-D49B-46FD-870F-99E10975C18F}" type="datetime1">
               <a:rPr lang="fr-FR" smtClean="0"/>
-              <a:t>20/01/2015</a:t>
+              <a:t>24/01/2015</a:t>
             </a:fld>
             <a:endParaRPr lang="fr-BE"/>
           </a:p>
@@ -6698,7 +6699,7 @@
           <a:p>
             <a:fld id="{DEEDBEA9-D968-4EC1-A19A-1F76B691A58C}" type="datetime1">
               <a:rPr lang="fr-FR" smtClean="0"/>
-              <a:t>20/01/2015</a:t>
+              <a:t>24/01/2015</a:t>
             </a:fld>
             <a:endParaRPr lang="fr-BE"/>
           </a:p>
@@ -6873,7 +6874,7 @@
           <a:p>
             <a:fld id="{9FC95688-4DB0-4F51-94A9-29BA89D545B3}" type="datetime1">
               <a:rPr lang="fr-FR" smtClean="0"/>
-              <a:t>20/01/2015</a:t>
+              <a:t>24/01/2015</a:t>
             </a:fld>
             <a:endParaRPr lang="fr-BE"/>
           </a:p>
@@ -7095,7 +7096,7 @@
           <a:p>
             <a:fld id="{20848678-D788-46FE-B700-C9269C74C891}" type="datetime1">
               <a:rPr lang="fr-FR" smtClean="0"/>
-              <a:t>20/01/2015</a:t>
+              <a:t>24/01/2015</a:t>
             </a:fld>
             <a:endParaRPr lang="fr-BE"/>
           </a:p>
@@ -7914,7 +7915,7 @@
           <a:p>
             <a:fld id="{79C16800-6255-4A73-95D9-53ECCA86BF18}" type="datetime1">
               <a:rPr lang="fr-FR" smtClean="0"/>
-              <a:t>20/01/2015</a:t>
+              <a:t>24/01/2015</a:t>
             </a:fld>
             <a:endParaRPr lang="fr-BE"/>
           </a:p>
@@ -8155,7 +8156,7 @@
           <a:p>
             <a:fld id="{2ECF0889-EA02-48F1-86FE-1B2AAC4C247E}" type="datetime1">
               <a:rPr lang="fr-FR" smtClean="0"/>
-              <a:t>20/01/2015</a:t>
+              <a:t>24/01/2015</a:t>
             </a:fld>
             <a:endParaRPr lang="fr-BE"/>
           </a:p>
@@ -8483,7 +8484,7 @@
           <a:p>
             <a:fld id="{712E9D54-6766-4EFC-BDD9-0C3193CEE8BD}" type="datetime1">
               <a:rPr lang="fr-FR" smtClean="0"/>
-              <a:t>20/01/2015</a:t>
+              <a:t>24/01/2015</a:t>
             </a:fld>
             <a:endParaRPr lang="fr-BE"/>
           </a:p>
@@ -8578,7 +8579,7 @@
           <a:p>
             <a:fld id="{5469AE92-F693-4AF4-B39E-ECB41C1DA14C}" type="datetime1">
               <a:rPr lang="fr-FR" smtClean="0"/>
-              <a:t>20/01/2015</a:t>
+              <a:t>24/01/2015</a:t>
             </a:fld>
             <a:endParaRPr lang="fr-BE"/>
           </a:p>
@@ -9100,7 +9101,7 @@
           <a:p>
             <a:fld id="{15EB620E-D183-4F2A-BD4F-6B1729D1A0DE}" type="datetime1">
               <a:rPr lang="fr-FR" smtClean="0"/>
-              <a:t>20/01/2015</a:t>
+              <a:t>24/01/2015</a:t>
             </a:fld>
             <a:endParaRPr lang="fr-BE"/>
           </a:p>
@@ -9616,7 +9617,7 @@
           <a:p>
             <a:fld id="{2D38B004-A344-4981-8789-E15D3302231A}" type="datetime1">
               <a:rPr lang="fr-FR" smtClean="0"/>
-              <a:t>20/01/2015</a:t>
+              <a:t>24/01/2015</a:t>
             </a:fld>
             <a:endParaRPr lang="fr-BE"/>
           </a:p>
@@ -9866,7 +9867,7 @@
           <a:p>
             <a:fld id="{002E150F-AA26-4E99-A02A-7CA355CA54B4}" type="datetime1">
               <a:rPr lang="fr-FR" smtClean="0"/>
-              <a:t>20/01/2015</a:t>
+              <a:t>24/01/2015</a:t>
             </a:fld>
             <a:endParaRPr lang="fr-BE"/>
           </a:p>
@@ -11882,51 +11883,133 @@
           </a:p>
         </p:txBody>
       </p:sp>
-      <p:pic>
-        <p:nvPicPr>
-          <p:cNvPr id="3074" name="Picture 2" descr="C:\Enseignements\GitHub\TP_Documents\Arduino\Arduino_Sources\Potentiometre\Potentiomètre_bb.png"/>
-          <p:cNvPicPr>
-            <a:picLocks noChangeAspect="1" noChangeArrowheads="1"/>
-          </p:cNvPicPr>
-          <p:nvPr/>
-        </p:nvPicPr>
-        <p:blipFill>
-          <a:blip r:embed="rId2" cstate="print">
-            <a:extLst>
-              <a:ext uri="{28A0092B-C50C-407E-A947-70E740481C1C}">
-                <a14:useLocalDpi xmlns:a14="http://schemas.microsoft.com/office/drawing/2010/main" val="0"/>
-              </a:ext>
-            </a:extLst>
-          </a:blip>
-          <a:srcRect/>
-          <a:stretch>
-            <a:fillRect/>
-          </a:stretch>
-        </p:blipFill>
-        <p:spPr bwMode="auto">
-          <a:xfrm>
-            <a:off x="1043608" y="1844824"/>
-            <a:ext cx="3881437" cy="2560638"/>
-          </a:xfrm>
-          <a:prstGeom prst="rect">
-            <a:avLst/>
-          </a:prstGeom>
-          <a:noFill/>
-          <a:extLst>
-            <a:ext uri="{909E8E84-426E-40DD-AFC4-6F175D3DCCD1}">
-              <a14:hiddenFill xmlns:a14="http://schemas.microsoft.com/office/drawing/2010/main">
-                <a:solidFill>
-                  <a:srgbClr val="FFFFFF"/>
-                </a:solidFill>
-              </a14:hiddenFill>
-            </a:ext>
-          </a:extLst>
-        </p:spPr>
-      </p:pic>
     </p:spTree>
     <p:extLst>
       <p:ext uri="{BB962C8B-B14F-4D97-AF65-F5344CB8AC3E}">
         <p14:creationId xmlns:p14="http://schemas.microsoft.com/office/powerpoint/2010/main" val="1400981599"/>
+      </p:ext>
+    </p:extLst>
+  </p:cSld>
+  <p:clrMapOvr>
+    <a:masterClrMapping/>
+  </p:clrMapOvr>
+</p:sld>
+</file>
+
+<file path=ppt/slides/slide7.xml><?xml version="1.0" encoding="utf-8"?>
+<p:sld xmlns:a="http://schemas.openxmlformats.org/drawingml/2006/main" xmlns:r="http://schemas.openxmlformats.org/officeDocument/2006/relationships" xmlns:p="http://schemas.openxmlformats.org/presentationml/2006/main">
+  <p:cSld>
+    <p:spTree>
+      <p:nvGrpSpPr>
+        <p:cNvPr id="1" name=""/>
+        <p:cNvGrpSpPr/>
+        <p:nvPr/>
+      </p:nvGrpSpPr>
+      <p:grpSpPr>
+        <a:xfrm>
+          <a:off x="0" y="0"/>
+          <a:ext cx="0" cy="0"/>
+          <a:chOff x="0" y="0"/>
+          <a:chExt cx="0" cy="0"/>
+        </a:xfrm>
+      </p:grpSpPr>
+      <p:sp>
+        <p:nvSpPr>
+          <p:cNvPr id="2" name="Titre 1"/>
+          <p:cNvSpPr>
+            <a:spLocks noGrp="1"/>
+          </p:cNvSpPr>
+          <p:nvPr>
+            <p:ph type="title"/>
+          </p:nvPr>
+        </p:nvSpPr>
+        <p:spPr/>
+        <p:txBody>
+          <a:bodyPr/>
+          <a:lstStyle/>
+          <a:p>
+            <a:r>
+              <a:rPr lang="fr-FR" dirty="0" smtClean="0"/>
+              <a:t>Pilota </a:t>
+            </a:r>
+            <a:r>
+              <a:rPr lang="fr-FR" smtClean="0"/>
+              <a:t>d’un moteur par le PWM</a:t>
+            </a:r>
+            <a:endParaRPr lang="fr-FR"/>
+          </a:p>
+        </p:txBody>
+      </p:sp>
+      <p:sp>
+        <p:nvSpPr>
+          <p:cNvPr id="3" name="Espace réservé du contenu 2"/>
+          <p:cNvSpPr>
+            <a:spLocks noGrp="1"/>
+          </p:cNvSpPr>
+          <p:nvPr>
+            <p:ph sz="quarter" idx="1"/>
+          </p:nvPr>
+        </p:nvSpPr>
+        <p:spPr/>
+        <p:txBody>
+          <a:bodyPr/>
+          <a:lstStyle/>
+          <a:p>
+            <a:endParaRPr lang="fr-FR"/>
+          </a:p>
+        </p:txBody>
+      </p:sp>
+      <p:sp>
+        <p:nvSpPr>
+          <p:cNvPr id="4" name="Espace réservé du numéro de diapositive 3"/>
+          <p:cNvSpPr>
+            <a:spLocks noGrp="1"/>
+          </p:cNvSpPr>
+          <p:nvPr>
+            <p:ph type="sldNum" sz="quarter" idx="15"/>
+          </p:nvPr>
+        </p:nvSpPr>
+        <p:spPr/>
+        <p:txBody>
+          <a:bodyPr/>
+          <a:lstStyle/>
+          <a:p>
+            <a:fld id="{CF4668DC-857F-487D-BFFA-8C0CA5037977}" type="slidenum">
+              <a:rPr lang="fr-BE" smtClean="0"/>
+              <a:pPr/>
+              <a:t>7</a:t>
+            </a:fld>
+            <a:endParaRPr lang="fr-BE"/>
+          </a:p>
+        </p:txBody>
+      </p:sp>
+      <p:sp>
+        <p:nvSpPr>
+          <p:cNvPr id="5" name="Espace réservé du pied de page 4"/>
+          <p:cNvSpPr>
+            <a:spLocks noGrp="1"/>
+          </p:cNvSpPr>
+          <p:nvPr>
+            <p:ph type="ftr" sz="quarter" idx="16"/>
+          </p:nvPr>
+        </p:nvSpPr>
+        <p:spPr/>
+        <p:txBody>
+          <a:bodyPr/>
+          <a:lstStyle/>
+          <a:p>
+            <a:r>
+              <a:rPr lang="fr-BE" smtClean="0"/>
+              <a:t>Xavier Pessoles - Jean-Pierre Pupier</a:t>
+            </a:r>
+            <a:endParaRPr lang="fr-BE"/>
+          </a:p>
+        </p:txBody>
+      </p:sp>
+    </p:spTree>
+    <p:extLst>
+      <p:ext uri="{BB962C8B-B14F-4D97-AF65-F5344CB8AC3E}">
+        <p14:creationId xmlns:p14="http://schemas.microsoft.com/office/powerpoint/2010/main" val="4280594490"/>
       </p:ext>
     </p:extLst>
   </p:cSld>

</xml_diff>